<commit_message>
Merged revision(s) 761-768 from branches/minimization_1:
git-svn-id: https://roadrunnerlib.googlecode.com/svn/trunk@917 c0027639-9190-0b57-01eb-f09a03790dae
</commit_message>
<xml_diff>
--- a/docs/powerPoints/PluginFramework_1.pptx
+++ b/docs/powerPoints/PluginFramework_1.pptx
@@ -8,7 +8,8 @@
     <p:sldId id="256" r:id="rId2"/>
     <p:sldId id="258" r:id="rId3"/>
     <p:sldId id="259" r:id="rId4"/>
-    <p:sldId id="260" r:id="rId5"/>
+    <p:sldId id="261" r:id="rId5"/>
+    <p:sldId id="260" r:id="rId6"/>
   </p:sldIdLst>
   <p:sldSz cx="12188825" cy="6858000"/>
   <p:notesSz cx="6858000" cy="9144000"/>
@@ -119,6 +120,7 @@
           <p14:sldIdLst>
             <p14:sldId id="258"/>
             <p14:sldId id="259"/>
+            <p14:sldId id="261"/>
             <p14:sldId id="260"/>
           </p14:sldIdLst>
         </p14:section>
@@ -334,7 +336,7 @@
             <a:fld id="{B61BEF0D-F0BB-DE4B-95CE-6DB70DBA9567}" type="datetimeFigureOut">
               <a:rPr lang="en-US" smtClean="0"/>
               <a:pPr/>
-              <a:t>4/1/2013</a:t>
+              <a:t>4/2/2013</a:t>
             </a:fld>
             <a:endParaRPr lang="en-US"/>
           </a:p>
@@ -772,7 +774,7 @@
             <a:fld id="{B61BEF0D-F0BB-DE4B-95CE-6DB70DBA9567}" type="datetimeFigureOut">
               <a:rPr lang="en-US" smtClean="0"/>
               <a:pPr/>
-              <a:t>4/1/2013</a:t>
+              <a:t>4/2/2013</a:t>
             </a:fld>
             <a:endParaRPr lang="en-US"/>
           </a:p>
@@ -1024,7 +1026,7 @@
             <a:fld id="{B61BEF0D-F0BB-DE4B-95CE-6DB70DBA9567}" type="datetimeFigureOut">
               <a:rPr lang="en-US" smtClean="0"/>
               <a:pPr/>
-              <a:t>4/1/2013</a:t>
+              <a:t>4/2/2013</a:t>
             </a:fld>
             <a:endParaRPr lang="en-US"/>
           </a:p>
@@ -1334,7 +1336,7 @@
             <a:fld id="{B61BEF0D-F0BB-DE4B-95CE-6DB70DBA9567}" type="datetimeFigureOut">
               <a:rPr lang="en-US" smtClean="0"/>
               <a:pPr/>
-              <a:t>4/1/2013</a:t>
+              <a:t>4/2/2013</a:t>
             </a:fld>
             <a:endParaRPr lang="en-US"/>
           </a:p>
@@ -1654,7 +1656,7 @@
             <a:fld id="{B61BEF0D-F0BB-DE4B-95CE-6DB70DBA9567}" type="datetimeFigureOut">
               <a:rPr lang="en-US" smtClean="0"/>
               <a:pPr/>
-              <a:t>4/1/2013</a:t>
+              <a:t>4/2/2013</a:t>
             </a:fld>
             <a:endParaRPr lang="en-US"/>
           </a:p>
@@ -1958,7 +1960,7 @@
             <a:fld id="{B61BEF0D-F0BB-DE4B-95CE-6DB70DBA9567}" type="datetimeFigureOut">
               <a:rPr lang="en-US" smtClean="0"/>
               <a:pPr/>
-              <a:t>4/1/2013</a:t>
+              <a:t>4/2/2013</a:t>
             </a:fld>
             <a:endParaRPr lang="en-US"/>
           </a:p>
@@ -2327,7 +2329,7 @@
             <a:fld id="{B61BEF0D-F0BB-DE4B-95CE-6DB70DBA9567}" type="datetimeFigureOut">
               <a:rPr lang="en-US" smtClean="0"/>
               <a:pPr/>
-              <a:t>4/1/2013</a:t>
+              <a:t>4/2/2013</a:t>
             </a:fld>
             <a:endParaRPr lang="en-US"/>
           </a:p>
@@ -2503,7 +2505,7 @@
             <a:fld id="{B61BEF0D-F0BB-DE4B-95CE-6DB70DBA9567}" type="datetimeFigureOut">
               <a:rPr lang="en-US" smtClean="0"/>
               <a:pPr/>
-              <a:t>4/1/2013</a:t>
+              <a:t>4/2/2013</a:t>
             </a:fld>
             <a:endParaRPr lang="en-US"/>
           </a:p>
@@ -2685,7 +2687,7 @@
             <a:fld id="{B61BEF0D-F0BB-DE4B-95CE-6DB70DBA9567}" type="datetimeFigureOut">
               <a:rPr lang="en-US" smtClean="0"/>
               <a:pPr/>
-              <a:t>4/1/2013</a:t>
+              <a:t>4/2/2013</a:t>
             </a:fld>
             <a:endParaRPr lang="en-US"/>
           </a:p>
@@ -2857,7 +2859,7 @@
             <a:fld id="{B61BEF0D-F0BB-DE4B-95CE-6DB70DBA9567}" type="datetimeFigureOut">
               <a:rPr lang="en-US" smtClean="0"/>
               <a:pPr/>
-              <a:t>4/1/2013</a:t>
+              <a:t>4/2/2013</a:t>
             </a:fld>
             <a:endParaRPr lang="en-US"/>
           </a:p>
@@ -3109,7 +3111,7 @@
             <a:fld id="{B61BEF0D-F0BB-DE4B-95CE-6DB70DBA9567}" type="datetimeFigureOut">
               <a:rPr lang="en-US" smtClean="0"/>
               <a:pPr/>
-              <a:t>4/1/2013</a:t>
+              <a:t>4/2/2013</a:t>
             </a:fld>
             <a:endParaRPr lang="en-US"/>
           </a:p>
@@ -3347,7 +3349,7 @@
             <a:fld id="{B61BEF0D-F0BB-DE4B-95CE-6DB70DBA9567}" type="datetimeFigureOut">
               <a:rPr lang="en-US" smtClean="0"/>
               <a:pPr/>
-              <a:t>4/1/2013</a:t>
+              <a:t>4/2/2013</a:t>
             </a:fld>
             <a:endParaRPr lang="en-US"/>
           </a:p>
@@ -3731,7 +3733,7 @@
             <a:fld id="{B61BEF0D-F0BB-DE4B-95CE-6DB70DBA9567}" type="datetimeFigureOut">
               <a:rPr lang="en-US" smtClean="0"/>
               <a:pPr/>
-              <a:t>4/1/2013</a:t>
+              <a:t>4/2/2013</a:t>
             </a:fld>
             <a:endParaRPr lang="en-US"/>
           </a:p>
@@ -3851,7 +3853,7 @@
             <a:fld id="{B61BEF0D-F0BB-DE4B-95CE-6DB70DBA9567}" type="datetimeFigureOut">
               <a:rPr lang="en-US" smtClean="0"/>
               <a:pPr/>
-              <a:t>4/1/2013</a:t>
+              <a:t>4/2/2013</a:t>
             </a:fld>
             <a:endParaRPr lang="en-US"/>
           </a:p>
@@ -3948,7 +3950,7 @@
             <a:fld id="{B61BEF0D-F0BB-DE4B-95CE-6DB70DBA9567}" type="datetimeFigureOut">
               <a:rPr lang="en-US" smtClean="0"/>
               <a:pPr/>
-              <a:t>4/1/2013</a:t>
+              <a:t>4/2/2013</a:t>
             </a:fld>
             <a:endParaRPr lang="en-US"/>
           </a:p>
@@ -4205,7 +4207,7 @@
             <a:fld id="{B61BEF0D-F0BB-DE4B-95CE-6DB70DBA9567}" type="datetimeFigureOut">
               <a:rPr lang="en-US" smtClean="0"/>
               <a:pPr/>
-              <a:t>4/1/2013</a:t>
+              <a:t>4/2/2013</a:t>
             </a:fld>
             <a:endParaRPr lang="en-US"/>
           </a:p>
@@ -4490,7 +4492,7 @@
             <a:fld id="{B61BEF0D-F0BB-DE4B-95CE-6DB70DBA9567}" type="datetimeFigureOut">
               <a:rPr lang="en-US" smtClean="0"/>
               <a:pPr/>
-              <a:t>4/1/2013</a:t>
+              <a:t>4/2/2013</a:t>
             </a:fld>
             <a:endParaRPr lang="en-US"/>
           </a:p>
@@ -4898,7 +4900,7 @@
             <a:fld id="{B61BEF0D-F0BB-DE4B-95CE-6DB70DBA9567}" type="datetimeFigureOut">
               <a:rPr lang="en-US" smtClean="0"/>
               <a:pPr/>
-              <a:t>4/1/2013</a:t>
+              <a:t>4/2/2013</a:t>
             </a:fld>
             <a:endParaRPr lang="en-US"/>
           </a:p>
@@ -5483,17 +5485,6 @@
               <a:t>Plugin Framework</a:t>
             </a:r>
           </a:p>
-          <a:p>
-            <a:pPr marL="342900" indent="-342900">
-              <a:buFont typeface="Arial" panose="020B0604020202020204" pitchFamily="34" charset="0"/>
-              <a:buChar char="•"/>
-            </a:pPr>
-            <a:r>
-              <a:rPr lang="en-US" dirty="0" smtClean="0"/>
-              <a:t>Threaded RoadRunner</a:t>
-            </a:r>
-            <a:endParaRPr lang="en-US" dirty="0"/>
-          </a:p>
         </p:txBody>
       </p:sp>
     </p:spTree>
@@ -5582,31 +5573,31 @@
           <a:lstStyle/>
           <a:p>
             <a:r>
-              <a:rPr lang="en-US" smtClean="0"/>
+              <a:rPr lang="en-US" dirty="0" smtClean="0"/>
               <a:t>Modular</a:t>
             </a:r>
           </a:p>
           <a:p>
             <a:r>
-              <a:rPr lang="en-US" smtClean="0"/>
+              <a:rPr lang="en-US" dirty="0" smtClean="0"/>
               <a:t>Developed independent of roadrunner main codebase</a:t>
             </a:r>
           </a:p>
           <a:p>
             <a:r>
-              <a:rPr lang="en-US" smtClean="0"/>
+              <a:rPr lang="en-US" dirty="0" smtClean="0"/>
               <a:t>Allows the use of libraries with other types of licenses (no need for static linking)</a:t>
             </a:r>
           </a:p>
           <a:p>
             <a:r>
-              <a:rPr lang="en-US" smtClean="0"/>
+              <a:rPr lang="en-US" dirty="0" smtClean="0"/>
               <a:t>Updates have less impact</a:t>
             </a:r>
           </a:p>
           <a:p>
             <a:r>
-              <a:rPr lang="en-US" smtClean="0"/>
+              <a:rPr lang="en-US" dirty="0" smtClean="0"/>
               <a:t>Could be written in any language that can create a shared library</a:t>
             </a:r>
           </a:p>
@@ -5614,7 +5605,7 @@
             <a:pPr marL="0" indent="0">
               <a:buNone/>
             </a:pPr>
-            <a:endParaRPr lang="en-US"/>
+            <a:endParaRPr lang="en-US" dirty="0"/>
           </a:p>
         </p:txBody>
       </p:sp>
@@ -5701,7 +5692,7 @@
         </p:spPr>
         <p:txBody>
           <a:bodyPr>
-            <a:normAutofit fontScale="92500" lnSpcReduction="10000"/>
+            <a:normAutofit fontScale="77500" lnSpcReduction="20000"/>
           </a:bodyPr>
           <a:lstStyle/>
           <a:p>
@@ -5710,7 +5701,7 @@
               <a:buChar char="Ø"/>
             </a:pPr>
             <a:r>
-              <a:rPr lang="en-US" smtClean="0"/>
+              <a:rPr lang="en-US" dirty="0" smtClean="0"/>
               <a:t>Roadrunner defines a plugin interface</a:t>
             </a:r>
           </a:p>
@@ -5720,7 +5711,7 @@
               <a:buChar char="Ø"/>
             </a:pPr>
             <a:r>
-              <a:rPr lang="en-US"/>
+              <a:rPr lang="en-US" dirty="0"/>
               <a:t>Each plugin exists in one shared library</a:t>
             </a:r>
           </a:p>
@@ -5730,7 +5721,7 @@
               <a:buChar char="Ø"/>
             </a:pPr>
             <a:r>
-              <a:rPr lang="en-US" smtClean="0"/>
+              <a:rPr lang="en-US" dirty="0" smtClean="0"/>
               <a:t>A roadrunner instance load/unload plugins at runtime</a:t>
             </a:r>
           </a:p>
@@ -5740,8 +5731,12 @@
               <a:buChar char="Ø"/>
             </a:pPr>
             <a:r>
-              <a:rPr lang="en-US" smtClean="0"/>
-              <a:t>Data is communicated by the use of Capabilities and Parameter classes</a:t>
+              <a:rPr lang="en-US" dirty="0" smtClean="0"/>
+              <a:t>Data is communicated by the use of Capabilities and </a:t>
+            </a:r>
+            <a:r>
+              <a:rPr lang="en-US" dirty="0" smtClean="0"/>
+              <a:t>Parameters</a:t>
             </a:r>
           </a:p>
           <a:p>
@@ -5749,7 +5744,18 @@
               <a:buFont typeface="Wingdings" panose="05000000000000000000" pitchFamily="2" charset="2"/>
               <a:buChar char="Ø"/>
             </a:pPr>
-            <a:endParaRPr lang="en-US" smtClean="0"/>
+            <a:r>
+              <a:rPr lang="en-US" dirty="0" smtClean="0"/>
+              <a:t>A parameter may have pointers to data that is allocated in the calling application</a:t>
+            </a:r>
+            <a:endParaRPr lang="en-US" dirty="0" smtClean="0"/>
+          </a:p>
+          <a:p>
+            <a:pPr marL="285750" indent="-285750">
+              <a:buFont typeface="Wingdings" panose="05000000000000000000" pitchFamily="2" charset="2"/>
+              <a:buChar char="Ø"/>
+            </a:pPr>
+            <a:endParaRPr lang="en-US" dirty="0" smtClean="0"/>
           </a:p>
         </p:txBody>
       </p:sp>
@@ -5792,6 +5798,259 @@
       </p:grpSpPr>
       <p:sp>
         <p:nvSpPr>
+          <p:cNvPr id="17" name="Title 16"/>
+          <p:cNvSpPr>
+            <a:spLocks noGrp="1"/>
+          </p:cNvSpPr>
+          <p:nvPr>
+            <p:ph type="title"/>
+          </p:nvPr>
+        </p:nvSpPr>
+        <p:spPr>
+          <a:xfrm>
+            <a:off x="684035" y="410275"/>
+            <a:ext cx="8532178" cy="798593"/>
+          </a:xfrm>
+        </p:spPr>
+        <p:txBody>
+          <a:bodyPr/>
+          <a:lstStyle/>
+          <a:p>
+            <a:r>
+              <a:rPr lang="en-US" dirty="0" smtClean="0"/>
+              <a:t>plugin API types</a:t>
+            </a:r>
+            <a:endParaRPr lang="en-US" dirty="0"/>
+          </a:p>
+        </p:txBody>
+      </p:sp>
+      <p:sp>
+        <p:nvSpPr>
+          <p:cNvPr id="18" name="Text Placeholder 17"/>
+          <p:cNvSpPr>
+            <a:spLocks noGrp="1"/>
+          </p:cNvSpPr>
+          <p:nvPr>
+            <p:ph type="body" idx="1"/>
+          </p:nvPr>
+        </p:nvSpPr>
+        <p:spPr>
+          <a:xfrm>
+            <a:off x="684035" y="1387098"/>
+            <a:ext cx="8532178" cy="4607302"/>
+          </a:xfrm>
+        </p:spPr>
+        <p:txBody>
+          <a:bodyPr/>
+          <a:lstStyle/>
+          <a:p>
+            <a:r>
+              <a:rPr lang="en-US" dirty="0" err="1" smtClean="0"/>
+              <a:t>RRParameterHandle</a:t>
+            </a:r>
+            <a:r>
+              <a:rPr lang="en-US" dirty="0" smtClean="0"/>
+              <a:t>	- Handle to a parameter.</a:t>
+            </a:r>
+          </a:p>
+          <a:p>
+            <a:r>
+              <a:rPr lang="en-US" dirty="0" smtClean="0"/>
+              <a:t>	The underlying parameter has the following attributes:</a:t>
+            </a:r>
+          </a:p>
+          <a:p>
+            <a:r>
+              <a:rPr lang="en-US" dirty="0"/>
+              <a:t>	</a:t>
+            </a:r>
+            <a:r>
+              <a:rPr lang="en-US" dirty="0" smtClean="0"/>
+              <a:t>	A </a:t>
+            </a:r>
+            <a:r>
+              <a:rPr lang="en-US" dirty="0"/>
+              <a:t>data </a:t>
+            </a:r>
+            <a:r>
+              <a:rPr lang="en-US" dirty="0" smtClean="0"/>
+              <a:t>value (</a:t>
+            </a:r>
+            <a:r>
+              <a:rPr lang="en-US" dirty="0" err="1" smtClean="0"/>
+              <a:t>ParameterType</a:t>
+            </a:r>
+            <a:r>
+              <a:rPr lang="en-US" dirty="0" smtClean="0"/>
+              <a:t>) </a:t>
+            </a:r>
+            <a:br>
+              <a:rPr lang="en-US" dirty="0" smtClean="0"/>
+            </a:br>
+            <a:r>
+              <a:rPr lang="en-US" dirty="0" smtClean="0"/>
+              <a:t>	</a:t>
+            </a:r>
+            <a:r>
+              <a:rPr lang="en-US" sz="1600" dirty="0" smtClean="0"/>
+              <a:t>		The data value can </a:t>
+            </a:r>
+            <a:r>
+              <a:rPr lang="en-US" sz="1600" dirty="0"/>
+              <a:t>be one of </a:t>
+            </a:r>
+            <a:r>
+              <a:rPr lang="en-US" sz="1200" dirty="0" err="1"/>
+              <a:t>ptString</a:t>
+            </a:r>
+            <a:r>
+              <a:rPr lang="en-US" sz="1200" dirty="0"/>
+              <a:t>, </a:t>
+            </a:r>
+            <a:r>
+              <a:rPr lang="en-US" sz="1200" dirty="0" err="1"/>
+              <a:t>ptInteger</a:t>
+            </a:r>
+            <a:r>
+              <a:rPr lang="en-US" sz="1200" dirty="0"/>
+              <a:t>, </a:t>
+            </a:r>
+            <a:r>
+              <a:rPr lang="en-US" sz="1200" dirty="0" err="1"/>
+              <a:t>ptDouble</a:t>
+            </a:r>
+            <a:r>
+              <a:rPr lang="en-US" sz="1200" dirty="0"/>
+              <a:t>, </a:t>
+            </a:r>
+            <a:r>
+              <a:rPr lang="en-US" sz="1200" dirty="0" err="1"/>
+              <a:t>ptVector</a:t>
+            </a:r>
+            <a:r>
+              <a:rPr lang="en-US" sz="1200" dirty="0"/>
+              <a:t>, </a:t>
+            </a:r>
+            <a:r>
+              <a:rPr lang="en-US" sz="1200" dirty="0" err="1" smtClean="0"/>
+              <a:t>ptMatrix</a:t>
+            </a:r>
+            <a:endParaRPr lang="en-US" sz="1200" dirty="0" smtClean="0"/>
+          </a:p>
+          <a:p>
+            <a:r>
+              <a:rPr lang="en-US" sz="1400" dirty="0"/>
+              <a:t>	</a:t>
+            </a:r>
+            <a:r>
+              <a:rPr lang="en-US" sz="1400" dirty="0" smtClean="0"/>
+              <a:t>	</a:t>
+            </a:r>
+            <a:r>
+              <a:rPr lang="en-US" sz="1600" dirty="0" smtClean="0"/>
+              <a:t>Hint </a:t>
+            </a:r>
+            <a:br>
+              <a:rPr lang="en-US" sz="1600" dirty="0" smtClean="0"/>
+            </a:br>
+            <a:r>
+              <a:rPr lang="en-US" sz="1600" dirty="0" smtClean="0"/>
+              <a:t>		Name</a:t>
+            </a:r>
+          </a:p>
+          <a:p>
+            <a:r>
+              <a:rPr lang="en-US" sz="1600" dirty="0" err="1" smtClean="0"/>
+              <a:t>RRPluginHandle</a:t>
+            </a:r>
+            <a:r>
+              <a:rPr lang="en-US" sz="1600" dirty="0" smtClean="0"/>
+              <a:t>	Not yet defined</a:t>
+            </a:r>
+          </a:p>
+          <a:p>
+            <a:endParaRPr lang="en-US" sz="1600" dirty="0"/>
+          </a:p>
+          <a:p>
+            <a:r>
+              <a:rPr lang="en-US" sz="1600" dirty="0" err="1" smtClean="0"/>
+              <a:t>RRCallBackFunction</a:t>
+            </a:r>
+            <a:r>
+              <a:rPr lang="en-US" sz="1600" dirty="0" smtClean="0"/>
+              <a:t>	Not yet defined</a:t>
+            </a:r>
+          </a:p>
+          <a:p>
+            <a:r>
+              <a:rPr lang="en-US" sz="1600" dirty="0"/>
+              <a:t>	</a:t>
+            </a:r>
+            <a:r>
+              <a:rPr lang="en-US" sz="1600" dirty="0" smtClean="0"/>
+              <a:t>In order to not have to query the plugin about its state, callbacks should be 	implemented, e.g. </a:t>
+            </a:r>
+            <a:r>
+              <a:rPr lang="en-US" sz="1600" dirty="0" err="1" smtClean="0"/>
+              <a:t>OnFinish</a:t>
+            </a:r>
+            <a:r>
+              <a:rPr lang="en-US" sz="1600" dirty="0" smtClean="0"/>
+              <a:t>(), </a:t>
+            </a:r>
+            <a:r>
+              <a:rPr lang="en-US" sz="1600" dirty="0" err="1" smtClean="0"/>
+              <a:t>OnProgress</a:t>
+            </a:r>
+            <a:r>
+              <a:rPr lang="en-US" sz="1600" dirty="0" smtClean="0"/>
+              <a:t>().. etc..</a:t>
+            </a:r>
+          </a:p>
+          <a:p>
+            <a:endParaRPr lang="en-US" sz="1600" dirty="0" smtClean="0"/>
+          </a:p>
+          <a:p>
+            <a:r>
+              <a:rPr lang="en-US" sz="1400" dirty="0"/>
+              <a:t>	</a:t>
+            </a:r>
+            <a:endParaRPr lang="en-US" dirty="0"/>
+          </a:p>
+        </p:txBody>
+      </p:sp>
+    </p:spTree>
+    <p:extLst>
+      <p:ext uri="{BB962C8B-B14F-4D97-AF65-F5344CB8AC3E}">
+        <p14:creationId xmlns:p14="http://schemas.microsoft.com/office/powerpoint/2010/main" val="1723969692"/>
+      </p:ext>
+    </p:extLst>
+  </p:cSld>
+  <p:clrMapOvr>
+    <a:masterClrMapping/>
+  </p:clrMapOvr>
+</p:sld>
+</file>
+
+<file path=ppt/slides/slide5.xml><?xml version="1.0" encoding="utf-8"?>
+<p:sld xmlns:a="http://schemas.openxmlformats.org/drawingml/2006/main" xmlns:r="http://schemas.openxmlformats.org/officeDocument/2006/relationships" xmlns:p="http://schemas.openxmlformats.org/presentationml/2006/main">
+  <p:cSld>
+    <p:spTree>
+      <p:nvGrpSpPr>
+        <p:cNvPr id="1" name=""/>
+        <p:cNvGrpSpPr/>
+        <p:nvPr/>
+      </p:nvGrpSpPr>
+      <p:grpSpPr>
+        <a:xfrm>
+          <a:off x="0" y="0"/>
+          <a:ext cx="0" cy="0"/>
+          <a:chOff x="0" y="0"/>
+          <a:chExt cx="0" cy="0"/>
+        </a:xfrm>
+      </p:grpSpPr>
+      <p:sp>
+        <p:nvSpPr>
           <p:cNvPr id="2" name="Title 1"/>
           <p:cNvSpPr>
             <a:spLocks noGrp="1"/>
@@ -5803,7 +6062,7 @@
         <p:spPr>
           <a:xfrm>
             <a:off x="344576" y="172766"/>
-            <a:ext cx="8534401" cy="2281600"/>
+            <a:ext cx="8534401" cy="834624"/>
           </a:xfrm>
         </p:spPr>
         <p:txBody>
@@ -5811,10 +6070,10 @@
           <a:lstStyle/>
           <a:p>
             <a:r>
-              <a:rPr lang="en-US" smtClean="0"/>
-              <a:t>Roadrunner internals</a:t>
-            </a:r>
-            <a:endParaRPr lang="en-US"/>
+              <a:rPr lang="en-US" dirty="0" smtClean="0"/>
+              <a:t>plugin API functions</a:t>
+            </a:r>
+            <a:endParaRPr lang="en-US" dirty="0"/>
           </a:p>
         </p:txBody>
       </p:sp>
@@ -5844,712 +6103,445 @@
           </a:p>
         </p:txBody>
       </p:sp>
-      <p:sp>
-        <p:nvSpPr>
-          <p:cNvPr id="9" name="Rectangle 8"/>
-          <p:cNvSpPr/>
+      <p:graphicFrame>
+        <p:nvGraphicFramePr>
+          <p:cNvPr id="3" name="Table 2"/>
+          <p:cNvGraphicFramePr>
+            <a:graphicFrameLocks noGrp="1"/>
+          </p:cNvGraphicFramePr>
+          <p:nvPr>
+            <p:extLst>
+              <p:ext uri="{D42A27DB-BD31-4B8C-83A1-F6EECF244321}">
+                <p14:modId xmlns:p14="http://schemas.microsoft.com/office/powerpoint/2010/main" val="1656453062"/>
+              </p:ext>
+            </p:extLst>
+          </p:nvPr>
+        </p:nvGraphicFramePr>
+        <p:xfrm>
+          <a:off x="344576" y="1108129"/>
+          <a:ext cx="10769896" cy="3541625"/>
+        </p:xfrm>
+        <a:graphic>
+          <a:graphicData uri="http://schemas.openxmlformats.org/drawingml/2006/table">
+            <a:tbl>
+              <a:tblPr firstRow="1" bandRow="1">
+                <a:tableStyleId>{5C22544A-7EE6-4342-B048-85BDC9FD1C3A}</a:tableStyleId>
+              </a:tblPr>
+              <a:tblGrid>
+                <a:gridCol w="2692474"/>
+                <a:gridCol w="2692474"/>
+                <a:gridCol w="2692474"/>
+                <a:gridCol w="2692474"/>
+              </a:tblGrid>
+              <a:tr h="289894">
+                <a:tc>
+                  <a:txBody>
+                    <a:bodyPr/>
+                    <a:lstStyle/>
+                    <a:p>
+                      <a:r>
+                        <a:rPr lang="en-US" dirty="0" smtClean="0"/>
+                        <a:t>return value</a:t>
+                      </a:r>
+                      <a:endParaRPr lang="en-US" dirty="0"/>
+                    </a:p>
+                  </a:txBody>
+                  <a:tcPr/>
+                </a:tc>
+                <a:tc>
+                  <a:txBody>
+                    <a:bodyPr/>
+                    <a:lstStyle/>
+                    <a:p>
+                      <a:r>
+                        <a:rPr lang="en-US" dirty="0" smtClean="0"/>
+                        <a:t>Name</a:t>
+                      </a:r>
+                      <a:endParaRPr lang="en-US" dirty="0"/>
+                    </a:p>
+                  </a:txBody>
+                  <a:tcPr/>
+                </a:tc>
+                <a:tc>
+                  <a:txBody>
+                    <a:bodyPr/>
+                    <a:lstStyle/>
+                    <a:p>
+                      <a:r>
+                        <a:rPr lang="en-US" dirty="0" smtClean="0"/>
+                        <a:t>Arguments</a:t>
+                      </a:r>
+                      <a:endParaRPr lang="en-US" dirty="0"/>
+                    </a:p>
+                  </a:txBody>
+                  <a:tcPr/>
+                </a:tc>
+                <a:tc>
+                  <a:txBody>
+                    <a:bodyPr/>
+                    <a:lstStyle/>
+                    <a:p>
+                      <a:r>
+                        <a:rPr lang="en-US" dirty="0" smtClean="0"/>
+                        <a:t>Info</a:t>
+                      </a:r>
+                      <a:endParaRPr lang="en-US" dirty="0"/>
+                    </a:p>
+                  </a:txBody>
+                  <a:tcPr/>
+                </a:tc>
+              </a:tr>
+              <a:tr h="673977">
+                <a:tc>
+                  <a:txBody>
+                    <a:bodyPr/>
+                    <a:lstStyle/>
+                    <a:p>
+                      <a:r>
+                        <a:rPr lang="en-US" dirty="0" smtClean="0"/>
+                        <a:t>String Array</a:t>
+                      </a:r>
+                      <a:endParaRPr lang="en-US" dirty="0"/>
+                    </a:p>
+                  </a:txBody>
+                  <a:tcPr/>
+                </a:tc>
+                <a:tc>
+                  <a:txBody>
+                    <a:bodyPr/>
+                    <a:lstStyle/>
+                    <a:p>
+                      <a:r>
+                        <a:rPr lang="en-US" dirty="0" err="1" smtClean="0"/>
+                        <a:t>getPluginCapabilities</a:t>
+                      </a:r>
+                      <a:endParaRPr lang="en-US" dirty="0"/>
+                    </a:p>
+                  </a:txBody>
+                  <a:tcPr/>
+                </a:tc>
+                <a:tc>
+                  <a:txBody>
+                    <a:bodyPr/>
+                    <a:lstStyle/>
+                    <a:p>
+                      <a:r>
+                        <a:rPr lang="en-US" dirty="0" err="1" smtClean="0"/>
+                        <a:t>rrHandle</a:t>
+                      </a:r>
+                      <a:r>
+                        <a:rPr lang="en-US" dirty="0" smtClean="0"/>
+                        <a:t>, </a:t>
+                      </a:r>
+                      <a:r>
+                        <a:rPr lang="en-US" dirty="0" err="1" smtClean="0"/>
+                        <a:t>pluginName</a:t>
+                      </a:r>
+                      <a:endParaRPr lang="en-US" dirty="0"/>
+                    </a:p>
+                  </a:txBody>
+                  <a:tcPr/>
+                </a:tc>
+                <a:tc>
+                  <a:txBody>
+                    <a:bodyPr/>
+                    <a:lstStyle/>
+                    <a:p>
+                      <a:r>
+                        <a:rPr lang="en-US" dirty="0" smtClean="0"/>
+                        <a:t>Returns</a:t>
+                      </a:r>
+                      <a:r>
+                        <a:rPr lang="en-US" baseline="0" dirty="0" smtClean="0"/>
+                        <a:t> a plugins capabilities names</a:t>
+                      </a:r>
+                      <a:endParaRPr lang="en-US" dirty="0"/>
+                    </a:p>
+                  </a:txBody>
+                  <a:tcPr/>
+                </a:tc>
+              </a:tr>
+              <a:tr h="673977">
+                <a:tc>
+                  <a:txBody>
+                    <a:bodyPr/>
+                    <a:lstStyle/>
+                    <a:p>
+                      <a:r>
+                        <a:rPr lang="en-US" dirty="0" smtClean="0"/>
+                        <a:t>String Array</a:t>
+                      </a:r>
+                      <a:endParaRPr lang="en-US" dirty="0"/>
+                    </a:p>
+                  </a:txBody>
+                  <a:tcPr/>
+                </a:tc>
+                <a:tc>
+                  <a:txBody>
+                    <a:bodyPr/>
+                    <a:lstStyle/>
+                    <a:p>
+                      <a:r>
+                        <a:rPr lang="en-US" dirty="0" err="1" smtClean="0"/>
+                        <a:t>getPluginParameters</a:t>
+                      </a:r>
+                      <a:endParaRPr lang="en-US" dirty="0"/>
+                    </a:p>
+                  </a:txBody>
+                  <a:tcPr/>
+                </a:tc>
+                <a:tc>
+                  <a:txBody>
+                    <a:bodyPr/>
+                    <a:lstStyle/>
+                    <a:p>
+                      <a:r>
+                        <a:rPr lang="en-US" dirty="0" err="1" smtClean="0"/>
+                        <a:t>rrHandle</a:t>
+                      </a:r>
+                      <a:r>
+                        <a:rPr lang="en-US" dirty="0" smtClean="0"/>
+                        <a:t>,</a:t>
+                      </a:r>
+                      <a:r>
+                        <a:rPr lang="en-US" baseline="0" dirty="0" smtClean="0"/>
+                        <a:t> </a:t>
+                      </a:r>
+                      <a:r>
+                        <a:rPr lang="en-US" baseline="0" dirty="0" err="1" smtClean="0"/>
+                        <a:t>pluginName</a:t>
+                      </a:r>
+                      <a:r>
+                        <a:rPr lang="en-US" baseline="0" dirty="0" smtClean="0"/>
+                        <a:t>, capability</a:t>
+                      </a:r>
+                      <a:endParaRPr lang="en-US" dirty="0"/>
+                    </a:p>
+                  </a:txBody>
+                  <a:tcPr/>
+                </a:tc>
+                <a:tc>
+                  <a:txBody>
+                    <a:bodyPr/>
+                    <a:lstStyle/>
+                    <a:p>
+                      <a:r>
+                        <a:rPr lang="en-US" dirty="0" smtClean="0"/>
+                        <a:t>Returns</a:t>
+                      </a:r>
+                      <a:r>
+                        <a:rPr lang="en-US" baseline="0" dirty="0" smtClean="0"/>
+                        <a:t> a capabilities parameter names</a:t>
+                      </a:r>
+                      <a:endParaRPr lang="en-US" dirty="0"/>
+                    </a:p>
+                  </a:txBody>
+                  <a:tcPr/>
+                </a:tc>
+              </a:tr>
+              <a:tr h="673977">
+                <a:tc>
+                  <a:txBody>
+                    <a:bodyPr/>
+                    <a:lstStyle/>
+                    <a:p>
+                      <a:r>
+                        <a:rPr lang="en-US" dirty="0" smtClean="0"/>
+                        <a:t>Parameter Handle</a:t>
+                      </a:r>
+                      <a:endParaRPr lang="en-US" dirty="0"/>
+                    </a:p>
+                  </a:txBody>
+                  <a:tcPr/>
+                </a:tc>
+                <a:tc>
+                  <a:txBody>
+                    <a:bodyPr/>
+                    <a:lstStyle/>
+                    <a:p>
+                      <a:r>
+                        <a:rPr lang="en-US" dirty="0" err="1" smtClean="0"/>
+                        <a:t>getPluginParameter</a:t>
+                      </a:r>
+                      <a:endParaRPr lang="en-US" dirty="0"/>
+                    </a:p>
+                  </a:txBody>
+                  <a:tcPr/>
+                </a:tc>
+                <a:tc>
+                  <a:txBody>
+                    <a:bodyPr/>
+                    <a:lstStyle/>
+                    <a:p>
+                      <a:r>
+                        <a:rPr lang="en-US" dirty="0" err="1" smtClean="0"/>
+                        <a:t>rrHandle</a:t>
+                      </a:r>
+                      <a:r>
+                        <a:rPr lang="en-US" dirty="0" smtClean="0"/>
+                        <a:t>, </a:t>
+                      </a:r>
+                      <a:r>
+                        <a:rPr lang="en-US" dirty="0" err="1" smtClean="0"/>
+                        <a:t>pluginName</a:t>
+                      </a:r>
+                      <a:r>
+                        <a:rPr lang="en-US" dirty="0" smtClean="0"/>
+                        <a:t>, </a:t>
+                      </a:r>
+                      <a:r>
+                        <a:rPr lang="en-US" dirty="0" err="1" smtClean="0"/>
+                        <a:t>parameterName</a:t>
+                      </a:r>
+                      <a:r>
+                        <a:rPr lang="en-US" dirty="0" smtClean="0"/>
+                        <a:t>, </a:t>
+                      </a:r>
+                      <a:r>
+                        <a:rPr lang="en-US" dirty="0" err="1" smtClean="0"/>
+                        <a:t>capabilitiesName</a:t>
+                      </a:r>
+                      <a:endParaRPr lang="en-US" dirty="0"/>
+                    </a:p>
+                  </a:txBody>
+                  <a:tcPr/>
+                </a:tc>
+                <a:tc>
+                  <a:txBody>
+                    <a:bodyPr/>
+                    <a:lstStyle/>
+                    <a:p>
+                      <a:r>
+                        <a:rPr lang="en-US" dirty="0" smtClean="0"/>
+                        <a:t>Returns a handle to a plugin parameter</a:t>
+                      </a:r>
+                      <a:endParaRPr lang="en-US" dirty="0"/>
+                    </a:p>
+                  </a:txBody>
+                  <a:tcPr/>
+                </a:tc>
+              </a:tr>
+              <a:tr h="673977">
+                <a:tc>
+                  <a:txBody>
+                    <a:bodyPr/>
+                    <a:lstStyle/>
+                    <a:p>
+                      <a:r>
+                        <a:rPr lang="en-US" dirty="0" err="1" smtClean="0"/>
+                        <a:t>bool</a:t>
+                      </a:r>
+                      <a:endParaRPr lang="en-US" dirty="0"/>
+                    </a:p>
+                  </a:txBody>
+                  <a:tcPr/>
+                </a:tc>
+                <a:tc>
+                  <a:txBody>
+                    <a:bodyPr/>
+                    <a:lstStyle/>
+                    <a:p>
+                      <a:r>
+                        <a:rPr lang="en-US" dirty="0" err="1" smtClean="0"/>
+                        <a:t>setPluginParameter</a:t>
+                      </a:r>
+                      <a:endParaRPr lang="en-US" dirty="0"/>
+                    </a:p>
+                  </a:txBody>
+                  <a:tcPr/>
+                </a:tc>
+                <a:tc>
+                  <a:txBody>
+                    <a:bodyPr/>
+                    <a:lstStyle/>
+                    <a:p>
+                      <a:r>
+                        <a:rPr lang="en-US" dirty="0" err="1" smtClean="0"/>
+                        <a:t>rrHandle</a:t>
+                      </a:r>
+                      <a:r>
+                        <a:rPr lang="en-US" dirty="0" smtClean="0"/>
+                        <a:t>, </a:t>
+                      </a:r>
+                      <a:r>
+                        <a:rPr lang="en-US" dirty="0" err="1" smtClean="0"/>
+                        <a:t>pluginName</a:t>
+                      </a:r>
+                      <a:r>
+                        <a:rPr lang="en-US" dirty="0" smtClean="0"/>
+                        <a:t>, </a:t>
+                      </a:r>
+                      <a:r>
+                        <a:rPr lang="en-US" dirty="0" err="1" smtClean="0"/>
+                        <a:t>parameterName</a:t>
+                      </a:r>
+                      <a:r>
+                        <a:rPr lang="en-US" dirty="0" smtClean="0"/>
+                        <a:t>, value</a:t>
+                      </a:r>
+                      <a:endParaRPr lang="en-US" dirty="0"/>
+                    </a:p>
+                  </a:txBody>
+                  <a:tcPr/>
+                </a:tc>
+                <a:tc>
+                  <a:txBody>
+                    <a:bodyPr/>
+                    <a:lstStyle/>
+                    <a:p>
+                      <a:r>
+                        <a:rPr lang="en-US" dirty="0" smtClean="0"/>
+                        <a:t>Set</a:t>
+                      </a:r>
+                      <a:r>
+                        <a:rPr lang="en-US" baseline="0" dirty="0" smtClean="0"/>
+                        <a:t> a parameter to value</a:t>
+                      </a:r>
+                      <a:endParaRPr lang="en-US" dirty="0"/>
+                    </a:p>
+                  </a:txBody>
+                  <a:tcPr/>
+                </a:tc>
+              </a:tr>
+            </a:tbl>
+          </a:graphicData>
+        </a:graphic>
+      </p:graphicFrame>
+      <p:sp>
+        <p:nvSpPr>
+          <p:cNvPr id="4" name="TextBox 3"/>
+          <p:cNvSpPr txBox="1"/>
           <p:nvPr/>
         </p:nvSpPr>
         <p:spPr>
           <a:xfrm>
-            <a:off x="7743457" y="0"/>
-            <a:ext cx="3547058" cy="6986528"/>
+            <a:off x="7570922" y="4773478"/>
+            <a:ext cx="2936929" cy="1477328"/>
           </a:xfrm>
           <a:prstGeom prst="rect">
             <a:avLst/>
           </a:prstGeom>
+          <a:noFill/>
         </p:spPr>
-        <p:style>
-          <a:lnRef idx="1">
-            <a:schemeClr val="accent4"/>
-          </a:lnRef>
-          <a:fillRef idx="1003">
-            <a:schemeClr val="lt2"/>
-          </a:fillRef>
-          <a:effectRef idx="1">
-            <a:schemeClr val="accent4"/>
-          </a:effectRef>
-          <a:fontRef idx="minor">
-            <a:schemeClr val="dk1"/>
-          </a:fontRef>
-        </p:style>
-        <p:txBody>
-          <a:bodyPr wrap="square">
+        <p:txBody>
+          <a:bodyPr wrap="square" rtlCol="0">
             <a:spAutoFit/>
           </a:bodyPr>
           <a:lstStyle/>
           <a:p>
             <a:r>
-              <a:rPr lang="en-US" sz="1400" dirty="0">
-                <a:solidFill>
-                  <a:srgbClr val="0000FF"/>
-                </a:solidFill>
-                <a:latin typeface="Consolas" panose="020B0609020204030204" pitchFamily="49" charset="0"/>
-              </a:rPr>
-              <a:t>class</a:t>
-            </a:r>
-            <a:r>
-              <a:rPr lang="en-US" sz="1400" dirty="0">
-                <a:solidFill>
-                  <a:prstClr val="black"/>
-                </a:solidFill>
-                <a:latin typeface="Consolas" panose="020B0609020204030204" pitchFamily="49" charset="0"/>
-              </a:rPr>
-              <a:t> </a:t>
-            </a:r>
-            <a:r>
-              <a:rPr lang="en-US" sz="1400" dirty="0" err="1">
-                <a:solidFill>
-                  <a:prstClr val="black"/>
-                </a:solidFill>
-                <a:latin typeface="Consolas" panose="020B0609020204030204" pitchFamily="49" charset="0"/>
-              </a:rPr>
-              <a:t>LoadSBML</a:t>
-            </a:r>
-            <a:r>
-              <a:rPr lang="en-US" sz="1400" dirty="0">
-                <a:solidFill>
-                  <a:prstClr val="black"/>
-                </a:solidFill>
-                <a:latin typeface="Consolas" panose="020B0609020204030204" pitchFamily="49" charset="0"/>
-              </a:rPr>
-              <a:t> : </a:t>
-            </a:r>
-            <a:r>
-              <a:rPr lang="en-US" sz="1400" dirty="0">
-                <a:solidFill>
-                  <a:srgbClr val="0000FF"/>
-                </a:solidFill>
-                <a:latin typeface="Consolas" panose="020B0609020204030204" pitchFamily="49" charset="0"/>
-              </a:rPr>
-              <a:t>public</a:t>
-            </a:r>
-            <a:r>
-              <a:rPr lang="en-US" sz="1400" dirty="0">
-                <a:solidFill>
-                  <a:prstClr val="black"/>
-                </a:solidFill>
-                <a:latin typeface="Consolas" panose="020B0609020204030204" pitchFamily="49" charset="0"/>
-              </a:rPr>
-              <a:t> </a:t>
-            </a:r>
-            <a:r>
-              <a:rPr lang="en-US" sz="1400" dirty="0" err="1">
-                <a:solidFill>
-                  <a:prstClr val="black"/>
-                </a:solidFill>
-                <a:latin typeface="Consolas" panose="020B0609020204030204" pitchFamily="49" charset="0"/>
-              </a:rPr>
-              <a:t>RoadRunnerThread</a:t>
-            </a:r>
-            <a:endParaRPr lang="en-US" sz="1400" dirty="0">
-              <a:solidFill>
-                <a:prstClr val="black"/>
-              </a:solidFill>
-              <a:latin typeface="Consolas" panose="020B0609020204030204" pitchFamily="49" charset="0"/>
-            </a:endParaRPr>
-          </a:p>
-          <a:p>
-            <a:r>
-              <a:rPr lang="en-US" sz="1400" dirty="0">
-                <a:solidFill>
-                  <a:prstClr val="black"/>
-                </a:solidFill>
-                <a:latin typeface="Consolas" panose="020B0609020204030204" pitchFamily="49" charset="0"/>
-              </a:rPr>
-              <a:t>{</a:t>
-            </a:r>
-          </a:p>
-          <a:p>
-            <a:r>
-              <a:rPr lang="en-US" sz="1400" dirty="0">
-                <a:solidFill>
-                  <a:srgbClr val="0000FF"/>
-                </a:solidFill>
-                <a:latin typeface="Consolas" panose="020B0609020204030204" pitchFamily="49" charset="0"/>
-              </a:rPr>
-              <a:t>protected</a:t>
-            </a:r>
-            <a:r>
-              <a:rPr lang="en-US" sz="1400" dirty="0">
-                <a:solidFill>
-                  <a:prstClr val="black"/>
-                </a:solidFill>
-                <a:latin typeface="Consolas" panose="020B0609020204030204" pitchFamily="49" charset="0"/>
-              </a:rPr>
-              <a:t>:</a:t>
-            </a:r>
-          </a:p>
-          <a:p>
-            <a:r>
-              <a:rPr lang="en-US" sz="1400" dirty="0" smtClean="0">
-                <a:solidFill>
-                  <a:prstClr val="black"/>
-                </a:solidFill>
-                <a:latin typeface="Consolas" panose="020B0609020204030204" pitchFamily="49" charset="0"/>
-              </a:rPr>
-              <a:t>	string </a:t>
-            </a:r>
-            <a:r>
-              <a:rPr lang="en-US" sz="1400" dirty="0" err="1" smtClean="0">
-                <a:solidFill>
-                  <a:prstClr val="black"/>
-                </a:solidFill>
-                <a:latin typeface="Consolas" panose="020B0609020204030204" pitchFamily="49" charset="0"/>
-              </a:rPr>
-              <a:t>mModelFileName</a:t>
-            </a:r>
-            <a:r>
-              <a:rPr lang="en-US" sz="1400" dirty="0">
-                <a:solidFill>
-                  <a:prstClr val="black"/>
-                </a:solidFill>
-                <a:latin typeface="Consolas" panose="020B0609020204030204" pitchFamily="49" charset="0"/>
-              </a:rPr>
-              <a:t>;</a:t>
-            </a:r>
-          </a:p>
-          <a:p>
-            <a:endParaRPr lang="en-US" sz="1400" dirty="0">
-              <a:solidFill>
-                <a:prstClr val="black"/>
-              </a:solidFill>
-              <a:latin typeface="Consolas" panose="020B0609020204030204" pitchFamily="49" charset="0"/>
-            </a:endParaRPr>
-          </a:p>
-          <a:p>
-            <a:r>
-              <a:rPr lang="en-US" sz="1400" dirty="0">
-                <a:solidFill>
-                  <a:srgbClr val="0000FF"/>
-                </a:solidFill>
-                <a:latin typeface="Consolas" panose="020B0609020204030204" pitchFamily="49" charset="0"/>
-              </a:rPr>
-              <a:t>public</a:t>
-            </a:r>
-            <a:r>
-              <a:rPr lang="en-US" sz="1400" dirty="0">
-                <a:solidFill>
-                  <a:prstClr val="black"/>
-                </a:solidFill>
-                <a:latin typeface="Consolas" panose="020B0609020204030204" pitchFamily="49" charset="0"/>
-              </a:rPr>
-              <a:t>:</a:t>
-            </a:r>
-          </a:p>
-          <a:p>
-            <a:r>
-              <a:rPr lang="en-US" sz="1400" dirty="0">
-                <a:solidFill>
-                  <a:prstClr val="black"/>
-                </a:solidFill>
-                <a:latin typeface="Consolas" panose="020B0609020204030204" pitchFamily="49" charset="0"/>
-              </a:rPr>
-              <a:t>    </a:t>
-            </a:r>
-            <a:r>
-              <a:rPr lang="en-US" sz="1400" dirty="0" err="1">
-                <a:solidFill>
-                  <a:prstClr val="black"/>
-                </a:solidFill>
-                <a:latin typeface="Consolas" panose="020B0609020204030204" pitchFamily="49" charset="0"/>
-              </a:rPr>
-              <a:t>LoadSBML</a:t>
-            </a:r>
-            <a:r>
-              <a:rPr lang="en-US" sz="1400" dirty="0">
-                <a:solidFill>
-                  <a:prstClr val="black"/>
-                </a:solidFill>
-                <a:latin typeface="Consolas" panose="020B0609020204030204" pitchFamily="49" charset="0"/>
-              </a:rPr>
-              <a:t>(RoadRunner* </a:t>
-            </a:r>
-            <a:r>
-              <a:rPr lang="en-US" sz="1400" dirty="0" err="1">
-                <a:solidFill>
-                  <a:prstClr val="black"/>
-                </a:solidFill>
-                <a:latin typeface="Consolas" panose="020B0609020204030204" pitchFamily="49" charset="0"/>
-              </a:rPr>
-              <a:t>rr</a:t>
-            </a:r>
-            <a:r>
-              <a:rPr lang="en-US" sz="1400" dirty="0">
-                <a:solidFill>
-                  <a:prstClr val="black"/>
-                </a:solidFill>
-                <a:latin typeface="Consolas" panose="020B0609020204030204" pitchFamily="49" charset="0"/>
-              </a:rPr>
-              <a:t>, </a:t>
-            </a:r>
-            <a:r>
-              <a:rPr lang="en-US" sz="1400" dirty="0" err="1">
-                <a:solidFill>
-                  <a:srgbClr val="0000FF"/>
-                </a:solidFill>
-                <a:latin typeface="Consolas" panose="020B0609020204030204" pitchFamily="49" charset="0"/>
-              </a:rPr>
-              <a:t>const</a:t>
-            </a:r>
-            <a:r>
-              <a:rPr lang="en-US" sz="1400" dirty="0">
-                <a:solidFill>
-                  <a:prstClr val="black"/>
-                </a:solidFill>
-                <a:latin typeface="Consolas" panose="020B0609020204030204" pitchFamily="49" charset="0"/>
-              </a:rPr>
-              <a:t> string&amp; </a:t>
-            </a:r>
-            <a:r>
-              <a:rPr lang="en-US" sz="1400" dirty="0" err="1">
-                <a:solidFill>
-                  <a:prstClr val="black"/>
-                </a:solidFill>
-                <a:latin typeface="Consolas" panose="020B0609020204030204" pitchFamily="49" charset="0"/>
-              </a:rPr>
-              <a:t>modelFile</a:t>
-            </a:r>
-            <a:r>
-              <a:rPr lang="en-US" sz="1400" dirty="0">
-                <a:solidFill>
-                  <a:prstClr val="black"/>
-                </a:solidFill>
-                <a:latin typeface="Consolas" panose="020B0609020204030204" pitchFamily="49" charset="0"/>
-              </a:rPr>
-              <a:t>)</a:t>
-            </a:r>
-          </a:p>
-          <a:p>
-            <a:r>
-              <a:rPr lang="en-US" sz="1400" dirty="0">
-                <a:solidFill>
-                  <a:prstClr val="black"/>
-                </a:solidFill>
-                <a:latin typeface="Consolas" panose="020B0609020204030204" pitchFamily="49" charset="0"/>
-              </a:rPr>
-              <a:t>                        :</a:t>
-            </a:r>
-          </a:p>
-          <a:p>
-            <a:r>
-              <a:rPr lang="en-US" sz="1400" dirty="0">
-                <a:solidFill>
-                  <a:prstClr val="black"/>
-                </a:solidFill>
-                <a:latin typeface="Consolas" panose="020B0609020204030204" pitchFamily="49" charset="0"/>
-              </a:rPr>
-              <a:t>                        </a:t>
-            </a:r>
-            <a:r>
-              <a:rPr lang="en-US" sz="1400" dirty="0" err="1">
-                <a:solidFill>
-                  <a:prstClr val="black"/>
-                </a:solidFill>
-                <a:latin typeface="Consolas" panose="020B0609020204030204" pitchFamily="49" charset="0"/>
-              </a:rPr>
-              <a:t>RoadRunnerThread</a:t>
-            </a:r>
-            <a:r>
-              <a:rPr lang="en-US" sz="1400" dirty="0">
-                <a:solidFill>
-                  <a:prstClr val="black"/>
-                </a:solidFill>
-                <a:latin typeface="Consolas" panose="020B0609020204030204" pitchFamily="49" charset="0"/>
-              </a:rPr>
-              <a:t>(</a:t>
-            </a:r>
-            <a:r>
-              <a:rPr lang="en-US" sz="1400" dirty="0" err="1">
-                <a:solidFill>
-                  <a:prstClr val="black"/>
-                </a:solidFill>
-                <a:latin typeface="Consolas" panose="020B0609020204030204" pitchFamily="49" charset="0"/>
-              </a:rPr>
-              <a:t>rr</a:t>
-            </a:r>
-            <a:r>
-              <a:rPr lang="en-US" sz="1400" dirty="0">
-                <a:solidFill>
-                  <a:prstClr val="black"/>
-                </a:solidFill>
-                <a:latin typeface="Consolas" panose="020B0609020204030204" pitchFamily="49" charset="0"/>
-              </a:rPr>
-              <a:t>),</a:t>
-            </a:r>
-          </a:p>
-          <a:p>
-            <a:r>
-              <a:rPr lang="en-US" sz="1400" dirty="0">
-                <a:solidFill>
-                  <a:prstClr val="black"/>
-                </a:solidFill>
-                <a:latin typeface="Consolas" panose="020B0609020204030204" pitchFamily="49" charset="0"/>
-              </a:rPr>
-              <a:t>                        </a:t>
-            </a:r>
-            <a:r>
-              <a:rPr lang="en-US" sz="1400" dirty="0" err="1">
-                <a:solidFill>
-                  <a:prstClr val="black"/>
-                </a:solidFill>
-                <a:latin typeface="Consolas" panose="020B0609020204030204" pitchFamily="49" charset="0"/>
-              </a:rPr>
-              <a:t>mModelFileName</a:t>
-            </a:r>
-            <a:r>
-              <a:rPr lang="en-US" sz="1400" dirty="0">
-                <a:solidFill>
-                  <a:prstClr val="black"/>
-                </a:solidFill>
-                <a:latin typeface="Consolas" panose="020B0609020204030204" pitchFamily="49" charset="0"/>
-              </a:rPr>
-              <a:t>(</a:t>
-            </a:r>
-            <a:r>
-              <a:rPr lang="en-US" sz="1400" dirty="0" err="1">
-                <a:solidFill>
-                  <a:prstClr val="black"/>
-                </a:solidFill>
-                <a:latin typeface="Consolas" panose="020B0609020204030204" pitchFamily="49" charset="0"/>
-              </a:rPr>
-              <a:t>modelFile</a:t>
-            </a:r>
-            <a:r>
-              <a:rPr lang="en-US" sz="1400" dirty="0">
-                <a:solidFill>
-                  <a:prstClr val="black"/>
-                </a:solidFill>
-                <a:latin typeface="Consolas" panose="020B0609020204030204" pitchFamily="49" charset="0"/>
-              </a:rPr>
-              <a:t>){}</a:t>
-            </a:r>
-          </a:p>
-          <a:p>
-            <a:endParaRPr lang="en-US" sz="1400" dirty="0">
-              <a:solidFill>
-                <a:prstClr val="black"/>
-              </a:solidFill>
-              <a:latin typeface="Consolas" panose="020B0609020204030204" pitchFamily="49" charset="0"/>
-            </a:endParaRPr>
-          </a:p>
-          <a:p>
-            <a:r>
-              <a:rPr lang="en-US" sz="1400" dirty="0">
-                <a:solidFill>
-                  <a:prstClr val="black"/>
-                </a:solidFill>
-                <a:latin typeface="Consolas" panose="020B0609020204030204" pitchFamily="49" charset="0"/>
-              </a:rPr>
-              <a:t>                    </a:t>
-            </a:r>
-            <a:r>
-              <a:rPr lang="en-US" sz="1400" dirty="0">
-                <a:solidFill>
-                  <a:srgbClr val="0000FF"/>
-                </a:solidFill>
-                <a:latin typeface="Consolas" panose="020B0609020204030204" pitchFamily="49" charset="0"/>
-              </a:rPr>
-              <a:t>void</a:t>
-            </a:r>
-            <a:r>
-              <a:rPr lang="en-US" sz="1400" dirty="0">
-                <a:solidFill>
-                  <a:prstClr val="black"/>
-                </a:solidFill>
-                <a:latin typeface="Consolas" panose="020B0609020204030204" pitchFamily="49" charset="0"/>
-              </a:rPr>
-              <a:t> worker()</a:t>
-            </a:r>
-          </a:p>
-          <a:p>
-            <a:r>
-              <a:rPr lang="en-US" sz="1400" dirty="0">
-                <a:solidFill>
-                  <a:prstClr val="black"/>
-                </a:solidFill>
-                <a:latin typeface="Consolas" panose="020B0609020204030204" pitchFamily="49" charset="0"/>
-              </a:rPr>
-              <a:t>                    {</a:t>
-            </a:r>
-          </a:p>
-          <a:p>
-            <a:r>
-              <a:rPr lang="en-US" sz="1400" dirty="0">
-                <a:solidFill>
-                  <a:prstClr val="black"/>
-                </a:solidFill>
-                <a:latin typeface="Consolas" panose="020B0609020204030204" pitchFamily="49" charset="0"/>
-              </a:rPr>
-              <a:t>                            </a:t>
-            </a:r>
-            <a:r>
-              <a:rPr lang="en-US" sz="1400" dirty="0">
-                <a:solidFill>
-                  <a:srgbClr val="0000FF"/>
-                </a:solidFill>
-                <a:latin typeface="Consolas" panose="020B0609020204030204" pitchFamily="49" charset="0"/>
-              </a:rPr>
-              <a:t>if</a:t>
-            </a:r>
-            <a:r>
-              <a:rPr lang="en-US" sz="1400" dirty="0">
-                <a:solidFill>
-                  <a:prstClr val="black"/>
-                </a:solidFill>
-                <a:latin typeface="Consolas" panose="020B0609020204030204" pitchFamily="49" charset="0"/>
-              </a:rPr>
-              <a:t>(</a:t>
-            </a:r>
-            <a:r>
-              <a:rPr lang="en-US" sz="1400" dirty="0" err="1">
-                <a:solidFill>
-                  <a:prstClr val="black"/>
-                </a:solidFill>
-                <a:latin typeface="Consolas" panose="020B0609020204030204" pitchFamily="49" charset="0"/>
-              </a:rPr>
-              <a:t>mRR</a:t>
-            </a:r>
-            <a:r>
-              <a:rPr lang="en-US" sz="1400" dirty="0">
-                <a:solidFill>
-                  <a:prstClr val="black"/>
-                </a:solidFill>
-                <a:latin typeface="Consolas" panose="020B0609020204030204" pitchFamily="49" charset="0"/>
-              </a:rPr>
-              <a:t>)</a:t>
-            </a:r>
-          </a:p>
-          <a:p>
-            <a:r>
-              <a:rPr lang="en-US" sz="1400" dirty="0">
-                <a:solidFill>
-                  <a:prstClr val="black"/>
-                </a:solidFill>
-                <a:latin typeface="Consolas" panose="020B0609020204030204" pitchFamily="49" charset="0"/>
-              </a:rPr>
-              <a:t>                            {</a:t>
-            </a:r>
-          </a:p>
-          <a:p>
-            <a:r>
-              <a:rPr lang="en-US" sz="1400" dirty="0">
-                <a:solidFill>
-                  <a:prstClr val="black"/>
-                </a:solidFill>
-                <a:latin typeface="Consolas" panose="020B0609020204030204" pitchFamily="49" charset="0"/>
-              </a:rPr>
-              <a:t>                            </a:t>
-            </a:r>
-            <a:r>
-              <a:rPr lang="en-US" sz="1400" dirty="0" smtClean="0">
-                <a:solidFill>
-                  <a:prstClr val="black"/>
-                </a:solidFill>
-                <a:latin typeface="Consolas" panose="020B0609020204030204" pitchFamily="49" charset="0"/>
-              </a:rPr>
-              <a:t>	</a:t>
-            </a:r>
-            <a:r>
-              <a:rPr lang="en-US" sz="1400" dirty="0" err="1" smtClean="0">
-                <a:solidFill>
-                  <a:prstClr val="black"/>
-                </a:solidFill>
-                <a:latin typeface="Consolas" panose="020B0609020204030204" pitchFamily="49" charset="0"/>
-              </a:rPr>
-              <a:t>mRR</a:t>
-            </a:r>
-            <a:r>
-              <a:rPr lang="en-US" sz="1400" dirty="0" smtClean="0">
-                <a:solidFill>
-                  <a:prstClr val="black"/>
-                </a:solidFill>
-                <a:latin typeface="Consolas" panose="020B0609020204030204" pitchFamily="49" charset="0"/>
-              </a:rPr>
-              <a:t>-</a:t>
-            </a:r>
-            <a:r>
-              <a:rPr lang="en-US" sz="1400" dirty="0">
-                <a:solidFill>
-                  <a:prstClr val="black"/>
-                </a:solidFill>
-                <a:latin typeface="Consolas" panose="020B0609020204030204" pitchFamily="49" charset="0"/>
-              </a:rPr>
-              <a:t>&gt;</a:t>
-            </a:r>
-            <a:r>
-              <a:rPr lang="en-US" sz="1400" dirty="0" err="1">
-                <a:solidFill>
-                  <a:prstClr val="black"/>
-                </a:solidFill>
-                <a:latin typeface="Consolas" panose="020B0609020204030204" pitchFamily="49" charset="0"/>
-              </a:rPr>
-              <a:t>loadSBMLFromFile</a:t>
-            </a:r>
-            <a:r>
-              <a:rPr lang="en-US" sz="1400" dirty="0">
-                <a:solidFill>
-                  <a:prstClr val="black"/>
-                </a:solidFill>
-                <a:latin typeface="Consolas" panose="020B0609020204030204" pitchFamily="49" charset="0"/>
-              </a:rPr>
-              <a:t>(</a:t>
-            </a:r>
-            <a:r>
-              <a:rPr lang="en-US" sz="1400" dirty="0" err="1">
-                <a:solidFill>
-                  <a:prstClr val="black"/>
-                </a:solidFill>
-                <a:latin typeface="Consolas" panose="020B0609020204030204" pitchFamily="49" charset="0"/>
-              </a:rPr>
-              <a:t>mModelFileName</a:t>
-            </a:r>
-            <a:r>
-              <a:rPr lang="en-US" sz="1400" dirty="0">
-                <a:solidFill>
-                  <a:prstClr val="black"/>
-                </a:solidFill>
-                <a:latin typeface="Consolas" panose="020B0609020204030204" pitchFamily="49" charset="0"/>
-              </a:rPr>
-              <a:t>);</a:t>
-            </a:r>
-          </a:p>
-          <a:p>
-            <a:r>
-              <a:rPr lang="en-US" sz="1400" dirty="0">
-                <a:solidFill>
-                  <a:prstClr val="black"/>
-                </a:solidFill>
-                <a:latin typeface="Consolas" panose="020B0609020204030204" pitchFamily="49" charset="0"/>
-              </a:rPr>
-              <a:t>                            }</a:t>
-            </a:r>
-          </a:p>
-          <a:p>
-            <a:r>
-              <a:rPr lang="en-US" sz="1400" dirty="0">
-                <a:solidFill>
-                  <a:prstClr val="black"/>
-                </a:solidFill>
-                <a:latin typeface="Consolas" panose="020B0609020204030204" pitchFamily="49" charset="0"/>
-              </a:rPr>
-              <a:t>                            </a:t>
-            </a:r>
-            <a:r>
-              <a:rPr lang="en-US" sz="1400" dirty="0">
-                <a:solidFill>
-                  <a:srgbClr val="0000FF"/>
-                </a:solidFill>
-                <a:latin typeface="Consolas" panose="020B0609020204030204" pitchFamily="49" charset="0"/>
-              </a:rPr>
-              <a:t>else</a:t>
-            </a:r>
-            <a:endParaRPr lang="en-US" sz="1400" dirty="0">
-              <a:solidFill>
-                <a:prstClr val="black"/>
-              </a:solidFill>
-              <a:latin typeface="Consolas" panose="020B0609020204030204" pitchFamily="49" charset="0"/>
-            </a:endParaRPr>
-          </a:p>
-          <a:p>
-            <a:r>
-              <a:rPr lang="en-US" sz="1400" dirty="0">
-                <a:solidFill>
-                  <a:prstClr val="black"/>
-                </a:solidFill>
-                <a:latin typeface="Consolas" panose="020B0609020204030204" pitchFamily="49" charset="0"/>
-              </a:rPr>
-              <a:t>                            {</a:t>
-            </a:r>
-          </a:p>
-          <a:p>
-            <a:r>
-              <a:rPr lang="en-US" sz="1400" dirty="0">
-                <a:solidFill>
-                  <a:prstClr val="black"/>
-                </a:solidFill>
-                <a:latin typeface="Consolas" panose="020B0609020204030204" pitchFamily="49" charset="0"/>
-              </a:rPr>
-              <a:t>                            </a:t>
-            </a:r>
-            <a:r>
-              <a:rPr lang="en-US" sz="1400" dirty="0" smtClean="0">
-                <a:solidFill>
-                  <a:prstClr val="black"/>
-                </a:solidFill>
-                <a:latin typeface="Consolas" panose="020B0609020204030204" pitchFamily="49" charset="0"/>
-              </a:rPr>
-              <a:t>	Log(</a:t>
-            </a:r>
-            <a:r>
-              <a:rPr lang="en-US" sz="1400" dirty="0" err="1" smtClean="0">
-                <a:solidFill>
-                  <a:prstClr val="black"/>
-                </a:solidFill>
-                <a:latin typeface="Consolas" panose="020B0609020204030204" pitchFamily="49" charset="0"/>
-              </a:rPr>
-              <a:t>lError</a:t>
-            </a:r>
-            <a:r>
-              <a:rPr lang="en-US" sz="1400" dirty="0">
-                <a:solidFill>
-                  <a:prstClr val="black"/>
-                </a:solidFill>
-                <a:latin typeface="Consolas" panose="020B0609020204030204" pitchFamily="49" charset="0"/>
-              </a:rPr>
-              <a:t>)&lt;&lt;</a:t>
-            </a:r>
-            <a:r>
-              <a:rPr lang="en-US" sz="1400" dirty="0">
-                <a:solidFill>
-                  <a:srgbClr val="A31515"/>
-                </a:solidFill>
-                <a:latin typeface="Consolas" panose="020B0609020204030204" pitchFamily="49" charset="0"/>
-              </a:rPr>
-              <a:t>"RoadRunner Handle is NULL"</a:t>
-            </a:r>
-            <a:r>
-              <a:rPr lang="en-US" sz="1400" dirty="0">
-                <a:solidFill>
-                  <a:prstClr val="black"/>
-                </a:solidFill>
-                <a:latin typeface="Consolas" panose="020B0609020204030204" pitchFamily="49" charset="0"/>
-              </a:rPr>
-              <a:t>;</a:t>
-            </a:r>
-          </a:p>
-          <a:p>
-            <a:r>
-              <a:rPr lang="en-US" sz="1400" dirty="0">
-                <a:solidFill>
-                  <a:prstClr val="black"/>
-                </a:solidFill>
-                <a:latin typeface="Consolas" panose="020B0609020204030204" pitchFamily="49" charset="0"/>
-              </a:rPr>
-              <a:t>                            }</a:t>
-            </a:r>
-          </a:p>
-          <a:p>
-            <a:r>
-              <a:rPr lang="en-US" sz="1400" dirty="0">
-                <a:solidFill>
-                  <a:prstClr val="black"/>
-                </a:solidFill>
-                <a:latin typeface="Consolas" panose="020B0609020204030204" pitchFamily="49" charset="0"/>
-              </a:rPr>
-              <a:t>                    }</a:t>
-            </a:r>
-          </a:p>
-          <a:p>
-            <a:r>
-              <a:rPr lang="en-US" sz="1400" dirty="0">
-                <a:solidFill>
-                  <a:prstClr val="black"/>
-                </a:solidFill>
-                <a:latin typeface="Consolas" panose="020B0609020204030204" pitchFamily="49" charset="0"/>
-              </a:rPr>
-              <a:t>};</a:t>
-            </a:r>
+              <a:rPr lang="en-US" dirty="0" smtClean="0"/>
+              <a:t>Note: instead of passing a </a:t>
+            </a:r>
+            <a:r>
+              <a:rPr lang="en-US" dirty="0" err="1" smtClean="0"/>
+              <a:t>rrHandle</a:t>
+            </a:r>
+            <a:r>
+              <a:rPr lang="en-US" dirty="0" smtClean="0"/>
+              <a:t> to these functions, a plugin handle may make more sense.</a:t>
+            </a:r>
+            <a:endParaRPr lang="en-US" dirty="0"/>
           </a:p>
         </p:txBody>
       </p:sp>

</xml_diff>